<commit_message>
last changes in april 2024
</commit_message>
<xml_diff>
--- a/Hardware/Layouts/Keyboard/KeyboardLayout_Z80_v00.pptx
+++ b/Hardware/Layouts/Keyboard/KeyboardLayout_Z80_v00.pptx
@@ -104,6 +104,11 @@
       </a:defRPr>
     </a:lvl9pPr>
   </p:defaultTextStyle>
+  <p:extLst>
+    <p:ext uri="{EFAFB233-063F-42B5-8137-9DF3F51BA10A}">
+      <p15:sldGuideLst xmlns:p15="http://schemas.microsoft.com/office/powerpoint/2012/main"/>
+    </p:ext>
+  </p:extLst>
 </p:presentation>
 </file>
 
@@ -120,12 +125,12 @@
   <pc:docChgLst>
     <pc:chgData name="Tomoko Margarida Inoue do Rego" userId="a13dfe35cafc0b17" providerId="LiveId" clId="{D067A3C2-84C4-42A2-95FF-601C80DF10D4}"/>
     <pc:docChg chg="undo custSel modSld">
-      <pc:chgData name="Tomoko Margarida Inoue do Rego" userId="a13dfe35cafc0b17" providerId="LiveId" clId="{D067A3C2-84C4-42A2-95FF-601C80DF10D4}" dt="2023-12-10T21:25:03.954" v="270" actId="207"/>
+      <pc:chgData name="Tomoko Margarida Inoue do Rego" userId="a13dfe35cafc0b17" providerId="LiveId" clId="{D067A3C2-84C4-42A2-95FF-601C80DF10D4}" dt="2024-01-13T01:47:00.242" v="282" actId="20577"/>
       <pc:docMkLst>
         <pc:docMk/>
       </pc:docMkLst>
       <pc:sldChg chg="addSp modSp mod">
-        <pc:chgData name="Tomoko Margarida Inoue do Rego" userId="a13dfe35cafc0b17" providerId="LiveId" clId="{D067A3C2-84C4-42A2-95FF-601C80DF10D4}" dt="2023-12-10T21:25:03.954" v="270" actId="207"/>
+        <pc:chgData name="Tomoko Margarida Inoue do Rego" userId="a13dfe35cafc0b17" providerId="LiveId" clId="{D067A3C2-84C4-42A2-95FF-601C80DF10D4}" dt="2024-01-13T01:47:00.242" v="282" actId="20577"/>
         <pc:sldMkLst>
           <pc:docMk/>
           <pc:sldMk cId="2757938999" sldId="256"/>
@@ -275,7 +280,7 @@
           </ac:spMkLst>
         </pc:spChg>
         <pc:spChg chg="mod">
-          <ac:chgData name="Tomoko Margarida Inoue do Rego" userId="a13dfe35cafc0b17" providerId="LiveId" clId="{D067A3C2-84C4-42A2-95FF-601C80DF10D4}" dt="2023-12-10T21:20:21.386" v="147" actId="1035"/>
+          <ac:chgData name="Tomoko Margarida Inoue do Rego" userId="a13dfe35cafc0b17" providerId="LiveId" clId="{D067A3C2-84C4-42A2-95FF-601C80DF10D4}" dt="2024-01-13T01:47:00.242" v="282" actId="20577"/>
           <ac:spMkLst>
             <pc:docMk/>
             <pc:sldMk cId="2757938999" sldId="256"/>
@@ -619,7 +624,7 @@
           <a:p>
             <a:fld id="{DBB41055-97ED-464E-86DD-13BA9D1013D4}" type="datetimeFigureOut">
               <a:rPr lang="pt-BR" smtClean="0"/>
-              <a:t>10/12/2023</a:t>
+              <a:t>12/01/2024</a:t>
             </a:fld>
             <a:endParaRPr lang="pt-BR"/>
           </a:p>
@@ -789,7 +794,7 @@
           <a:p>
             <a:fld id="{DBB41055-97ED-464E-86DD-13BA9D1013D4}" type="datetimeFigureOut">
               <a:rPr lang="pt-BR" smtClean="0"/>
-              <a:t>10/12/2023</a:t>
+              <a:t>12/01/2024</a:t>
             </a:fld>
             <a:endParaRPr lang="pt-BR"/>
           </a:p>
@@ -969,7 +974,7 @@
           <a:p>
             <a:fld id="{DBB41055-97ED-464E-86DD-13BA9D1013D4}" type="datetimeFigureOut">
               <a:rPr lang="pt-BR" smtClean="0"/>
-              <a:t>10/12/2023</a:t>
+              <a:t>12/01/2024</a:t>
             </a:fld>
             <a:endParaRPr lang="pt-BR"/>
           </a:p>
@@ -1139,7 +1144,7 @@
           <a:p>
             <a:fld id="{DBB41055-97ED-464E-86DD-13BA9D1013D4}" type="datetimeFigureOut">
               <a:rPr lang="pt-BR" smtClean="0"/>
-              <a:t>10/12/2023</a:t>
+              <a:t>12/01/2024</a:t>
             </a:fld>
             <a:endParaRPr lang="pt-BR"/>
           </a:p>
@@ -1383,7 +1388,7 @@
           <a:p>
             <a:fld id="{DBB41055-97ED-464E-86DD-13BA9D1013D4}" type="datetimeFigureOut">
               <a:rPr lang="pt-BR" smtClean="0"/>
-              <a:t>10/12/2023</a:t>
+              <a:t>12/01/2024</a:t>
             </a:fld>
             <a:endParaRPr lang="pt-BR"/>
           </a:p>
@@ -1615,7 +1620,7 @@
           <a:p>
             <a:fld id="{DBB41055-97ED-464E-86DD-13BA9D1013D4}" type="datetimeFigureOut">
               <a:rPr lang="pt-BR" smtClean="0"/>
-              <a:t>10/12/2023</a:t>
+              <a:t>12/01/2024</a:t>
             </a:fld>
             <a:endParaRPr lang="pt-BR"/>
           </a:p>
@@ -1982,7 +1987,7 @@
           <a:p>
             <a:fld id="{DBB41055-97ED-464E-86DD-13BA9D1013D4}" type="datetimeFigureOut">
               <a:rPr lang="pt-BR" smtClean="0"/>
-              <a:t>10/12/2023</a:t>
+              <a:t>12/01/2024</a:t>
             </a:fld>
             <a:endParaRPr lang="pt-BR"/>
           </a:p>
@@ -2100,7 +2105,7 @@
           <a:p>
             <a:fld id="{DBB41055-97ED-464E-86DD-13BA9D1013D4}" type="datetimeFigureOut">
               <a:rPr lang="pt-BR" smtClean="0"/>
-              <a:t>10/12/2023</a:t>
+              <a:t>12/01/2024</a:t>
             </a:fld>
             <a:endParaRPr lang="pt-BR"/>
           </a:p>
@@ -2195,7 +2200,7 @@
           <a:p>
             <a:fld id="{DBB41055-97ED-464E-86DD-13BA9D1013D4}" type="datetimeFigureOut">
               <a:rPr lang="pt-BR" smtClean="0"/>
-              <a:t>10/12/2023</a:t>
+              <a:t>12/01/2024</a:t>
             </a:fld>
             <a:endParaRPr lang="pt-BR"/>
           </a:p>
@@ -2472,7 +2477,7 @@
           <a:p>
             <a:fld id="{DBB41055-97ED-464E-86DD-13BA9D1013D4}" type="datetimeFigureOut">
               <a:rPr lang="pt-BR" smtClean="0"/>
-              <a:t>10/12/2023</a:t>
+              <a:t>12/01/2024</a:t>
             </a:fld>
             <a:endParaRPr lang="pt-BR"/>
           </a:p>
@@ -2729,7 +2734,7 @@
           <a:p>
             <a:fld id="{DBB41055-97ED-464E-86DD-13BA9D1013D4}" type="datetimeFigureOut">
               <a:rPr lang="pt-BR" smtClean="0"/>
-              <a:t>10/12/2023</a:t>
+              <a:t>12/01/2024</a:t>
             </a:fld>
             <a:endParaRPr lang="pt-BR"/>
           </a:p>
@@ -2942,7 +2947,7 @@
           <a:p>
             <a:fld id="{DBB41055-97ED-464E-86DD-13BA9D1013D4}" type="datetimeFigureOut">
               <a:rPr lang="pt-BR" smtClean="0"/>
-              <a:t>10/12/2023</a:t>
+              <a:t>12/01/2024</a:t>
             </a:fld>
             <a:endParaRPr lang="pt-BR"/>
           </a:p>
@@ -4477,7 +4482,7 @@
                 <a:ea typeface="Yu Mincho" panose="02020400000000000000" pitchFamily="18" charset="-128"/>
                 <a:cs typeface="Times New Roman" panose="02020603050405020304" pitchFamily="18" charset="0"/>
               </a:rPr>
-              <a:t>GO</a:t>
+              <a:t>ADDR</a:t>
             </a:r>
             <a:endParaRPr lang="pt-BR" sz="1100" dirty="0">
               <a:latin typeface="Calibri" panose="020F0502020204030204" pitchFamily="34" charset="0"/>

</xml_diff>